<commit_message>
Update proposal and powerpoint
</commit_message>
<xml_diff>
--- a/Proposal-Presentation.pptx
+++ b/Proposal-Presentation.pptx
@@ -6,10 +6,12 @@
   </p:sldMasterIdLst>
   <p:sldIdLst>
     <p:sldId id="256" r:id="rId2"/>
-    <p:sldId id="257" r:id="rId3"/>
-    <p:sldId id="258" r:id="rId4"/>
-    <p:sldId id="259" r:id="rId5"/>
-    <p:sldId id="260" r:id="rId6"/>
+    <p:sldId id="263" r:id="rId3"/>
+    <p:sldId id="257" r:id="rId4"/>
+    <p:sldId id="262" r:id="rId5"/>
+    <p:sldId id="258" r:id="rId6"/>
+    <p:sldId id="259" r:id="rId7"/>
+    <p:sldId id="260" r:id="rId8"/>
   </p:sldIdLst>
   <p:sldSz cx="12192000" cy="6858000"/>
   <p:notesSz cx="6858000" cy="9144000"/>
@@ -108,6 +110,11 @@
       </a:defRPr>
     </a:lvl9pPr>
   </p:defaultTextStyle>
+  <p:extLst>
+    <p:ext uri="{EFAFB233-063F-42B5-8137-9DF3F51BA10A}">
+      <p15:sldGuideLst xmlns:p15="http://schemas.microsoft.com/office/powerpoint/2012/main"/>
+    </p:ext>
+  </p:extLst>
 </p:presentation>
 </file>
 
@@ -117,159 +124,6 @@
     <p1510:client id="{034977F2-A2FC-48AB-9F1B-D544D8E16950}" v="3" dt="2026-01-21T08:53:53.480"/>
   </p1510:revLst>
 </p1510:revInfo>
-</file>
-
-<file path=ppt/changesInfos/changesInfo1.xml><?xml version="1.0" encoding="utf-8"?>
-<pc:chgInfo xmlns:a="http://schemas.openxmlformats.org/drawingml/2006/main" xmlns:r="http://schemas.openxmlformats.org/officeDocument/2006/relationships" xmlns:ac="http://schemas.microsoft.com/office/drawing/2013/main/command" xmlns:pc="http://schemas.microsoft.com/office/powerpoint/2013/main/command">
-  <pc:docChgLst>
-    <pc:chgData name="Andre Gnandt" userId="9098d253666265ea" providerId="LiveId" clId="{BE1BF0AD-01C9-4F9E-B666-8C6372287474}"/>
-    <pc:docChg chg="custSel addSld modSld">
-      <pc:chgData name="Andre Gnandt" userId="9098d253666265ea" providerId="LiveId" clId="{BE1BF0AD-01C9-4F9E-B666-8C6372287474}" dt="2026-01-21T09:13:53.219" v="1950" actId="20577"/>
-      <pc:docMkLst>
-        <pc:docMk/>
-      </pc:docMkLst>
-      <pc:sldChg chg="addSp delSp modSp mod">
-        <pc:chgData name="Andre Gnandt" userId="9098d253666265ea" providerId="LiveId" clId="{BE1BF0AD-01C9-4F9E-B666-8C6372287474}" dt="2026-01-21T08:57:27.913" v="421" actId="20577"/>
-        <pc:sldMkLst>
-          <pc:docMk/>
-          <pc:sldMk cId="3386284658" sldId="256"/>
-        </pc:sldMkLst>
-        <pc:spChg chg="mod">
-          <ac:chgData name="Andre Gnandt" userId="9098d253666265ea" providerId="LiveId" clId="{BE1BF0AD-01C9-4F9E-B666-8C6372287474}" dt="2026-01-21T08:52:44.422" v="95" actId="14100"/>
-          <ac:spMkLst>
-            <pc:docMk/>
-            <pc:sldMk cId="3386284658" sldId="256"/>
-            <ac:spMk id="2" creationId="{E1AFF80D-2AE2-74FA-9514-8E5FEE8D7860}"/>
-          </ac:spMkLst>
-        </pc:spChg>
-        <pc:spChg chg="mod">
-          <ac:chgData name="Andre Gnandt" userId="9098d253666265ea" providerId="LiveId" clId="{BE1BF0AD-01C9-4F9E-B666-8C6372287474}" dt="2026-01-21T08:52:36.397" v="89" actId="27636"/>
-          <ac:spMkLst>
-            <pc:docMk/>
-            <pc:sldMk cId="3386284658" sldId="256"/>
-            <ac:spMk id="3" creationId="{5527690D-367E-C4B8-23DB-5220C4C04ECB}"/>
-          </ac:spMkLst>
-        </pc:spChg>
-        <pc:spChg chg="add del mod">
-          <ac:chgData name="Andre Gnandt" userId="9098d253666265ea" providerId="LiveId" clId="{BE1BF0AD-01C9-4F9E-B666-8C6372287474}" dt="2026-01-21T08:52:32.038" v="86"/>
-          <ac:spMkLst>
-            <pc:docMk/>
-            <pc:sldMk cId="3386284658" sldId="256"/>
-            <ac:spMk id="4" creationId="{C4D78B61-E6C5-C9E6-17CA-BCFEE05D68C7}"/>
-          </ac:spMkLst>
-        </pc:spChg>
-        <pc:spChg chg="add mod">
-          <ac:chgData name="Andre Gnandt" userId="9098d253666265ea" providerId="LiveId" clId="{BE1BF0AD-01C9-4F9E-B666-8C6372287474}" dt="2026-01-21T08:57:27.913" v="421" actId="20577"/>
-          <ac:spMkLst>
-            <pc:docMk/>
-            <pc:sldMk cId="3386284658" sldId="256"/>
-            <ac:spMk id="5" creationId="{230DDF7B-B0AC-1E0F-030B-EDD73445A139}"/>
-          </ac:spMkLst>
-        </pc:spChg>
-      </pc:sldChg>
-      <pc:sldChg chg="addSp modSp new mod">
-        <pc:chgData name="Andre Gnandt" userId="9098d253666265ea" providerId="LiveId" clId="{BE1BF0AD-01C9-4F9E-B666-8C6372287474}" dt="2026-01-21T09:13:53.219" v="1950" actId="20577"/>
-        <pc:sldMkLst>
-          <pc:docMk/>
-          <pc:sldMk cId="336276173" sldId="257"/>
-        </pc:sldMkLst>
-        <pc:spChg chg="mod">
-          <ac:chgData name="Andre Gnandt" userId="9098d253666265ea" providerId="LiveId" clId="{BE1BF0AD-01C9-4F9E-B666-8C6372287474}" dt="2026-01-21T09:01:54.718" v="696" actId="20577"/>
-          <ac:spMkLst>
-            <pc:docMk/>
-            <pc:sldMk cId="336276173" sldId="257"/>
-            <ac:spMk id="2" creationId="{EA4BFAEC-7D3C-8591-5CD7-C227C70DC507}"/>
-          </ac:spMkLst>
-        </pc:spChg>
-        <pc:spChg chg="mod">
-          <ac:chgData name="Andre Gnandt" userId="9098d253666265ea" providerId="LiveId" clId="{BE1BF0AD-01C9-4F9E-B666-8C6372287474}" dt="2026-01-21T09:13:53.219" v="1950" actId="20577"/>
-          <ac:spMkLst>
-            <pc:docMk/>
-            <pc:sldMk cId="336276173" sldId="257"/>
-            <ac:spMk id="3" creationId="{D1DCA672-993F-D275-4E8F-DD32CC8308F6}"/>
-          </ac:spMkLst>
-        </pc:spChg>
-        <pc:spChg chg="add mod">
-          <ac:chgData name="Andre Gnandt" userId="9098d253666265ea" providerId="LiveId" clId="{BE1BF0AD-01C9-4F9E-B666-8C6372287474}" dt="2026-01-21T09:08:57.031" v="1396" actId="20577"/>
-          <ac:spMkLst>
-            <pc:docMk/>
-            <pc:sldMk cId="336276173" sldId="257"/>
-            <ac:spMk id="4" creationId="{3EF7B583-9B8F-17FE-AF7D-4D1FC53077D2}"/>
-          </ac:spMkLst>
-        </pc:spChg>
-      </pc:sldChg>
-      <pc:sldChg chg="modSp new mod">
-        <pc:chgData name="Andre Gnandt" userId="9098d253666265ea" providerId="LiveId" clId="{BE1BF0AD-01C9-4F9E-B666-8C6372287474}" dt="2026-01-21T09:13:37.889" v="1917" actId="27636"/>
-        <pc:sldMkLst>
-          <pc:docMk/>
-          <pc:sldMk cId="60825484" sldId="258"/>
-        </pc:sldMkLst>
-        <pc:spChg chg="mod">
-          <ac:chgData name="Andre Gnandt" userId="9098d253666265ea" providerId="LiveId" clId="{BE1BF0AD-01C9-4F9E-B666-8C6372287474}" dt="2026-01-21T09:01:33.606" v="690" actId="403"/>
-          <ac:spMkLst>
-            <pc:docMk/>
-            <pc:sldMk cId="60825484" sldId="258"/>
-            <ac:spMk id="2" creationId="{6DFB0C81-E219-E4E3-548E-360290808770}"/>
-          </ac:spMkLst>
-        </pc:spChg>
-        <pc:spChg chg="mod">
-          <ac:chgData name="Andre Gnandt" userId="9098d253666265ea" providerId="LiveId" clId="{BE1BF0AD-01C9-4F9E-B666-8C6372287474}" dt="2026-01-21T09:13:37.889" v="1917" actId="27636"/>
-          <ac:spMkLst>
-            <pc:docMk/>
-            <pc:sldMk cId="60825484" sldId="258"/>
-            <ac:spMk id="3" creationId="{EAA93609-261F-FBB6-A5FC-02C369379B9C}"/>
-          </ac:spMkLst>
-        </pc:spChg>
-      </pc:sldChg>
-      <pc:sldChg chg="modSp new mod">
-        <pc:chgData name="Andre Gnandt" userId="9098d253666265ea" providerId="LiveId" clId="{BE1BF0AD-01C9-4F9E-B666-8C6372287474}" dt="2026-01-21T09:12:55.845" v="1893" actId="20577"/>
-        <pc:sldMkLst>
-          <pc:docMk/>
-          <pc:sldMk cId="3054548008" sldId="259"/>
-        </pc:sldMkLst>
-        <pc:spChg chg="mod">
-          <ac:chgData name="Andre Gnandt" userId="9098d253666265ea" providerId="LiveId" clId="{BE1BF0AD-01C9-4F9E-B666-8C6372287474}" dt="2026-01-21T09:09:30.292" v="1407" actId="14100"/>
-          <ac:spMkLst>
-            <pc:docMk/>
-            <pc:sldMk cId="3054548008" sldId="259"/>
-            <ac:spMk id="2" creationId="{38B4628B-8EB3-E9EB-F455-F7AAEB847B9E}"/>
-          </ac:spMkLst>
-        </pc:spChg>
-        <pc:spChg chg="mod">
-          <ac:chgData name="Andre Gnandt" userId="9098d253666265ea" providerId="LiveId" clId="{BE1BF0AD-01C9-4F9E-B666-8C6372287474}" dt="2026-01-21T09:12:55.845" v="1893" actId="20577"/>
-          <ac:spMkLst>
-            <pc:docMk/>
-            <pc:sldMk cId="3054548008" sldId="259"/>
-            <ac:spMk id="3" creationId="{542B5D9C-FA30-10AF-D7C7-D6ED3DFAECC6}"/>
-          </ac:spMkLst>
-        </pc:spChg>
-      </pc:sldChg>
-      <pc:sldChg chg="modSp new mod">
-        <pc:chgData name="Andre Gnandt" userId="9098d253666265ea" providerId="LiveId" clId="{BE1BF0AD-01C9-4F9E-B666-8C6372287474}" dt="2026-01-21T09:12:21.011" v="1888" actId="1076"/>
-        <pc:sldMkLst>
-          <pc:docMk/>
-          <pc:sldMk cId="2093209199" sldId="260"/>
-        </pc:sldMkLst>
-        <pc:spChg chg="mod">
-          <ac:chgData name="Andre Gnandt" userId="9098d253666265ea" providerId="LiveId" clId="{BE1BF0AD-01C9-4F9E-B666-8C6372287474}" dt="2026-01-21T09:11:21.862" v="1748" actId="14100"/>
-          <ac:spMkLst>
-            <pc:docMk/>
-            <pc:sldMk cId="2093209199" sldId="260"/>
-            <ac:spMk id="2" creationId="{8B70C4F5-CC3A-3031-6A34-51077536BB0E}"/>
-          </ac:spMkLst>
-        </pc:spChg>
-        <pc:spChg chg="mod">
-          <ac:chgData name="Andre Gnandt" userId="9098d253666265ea" providerId="LiveId" clId="{BE1BF0AD-01C9-4F9E-B666-8C6372287474}" dt="2026-01-21T09:12:21.011" v="1888" actId="1076"/>
-          <ac:spMkLst>
-            <pc:docMk/>
-            <pc:sldMk cId="2093209199" sldId="260"/>
-            <ac:spMk id="3" creationId="{82E62C18-AD31-8011-908A-80B4A9FE309A}"/>
-          </ac:spMkLst>
-        </pc:spChg>
-      </pc:sldChg>
-    </pc:docChg>
-  </pc:docChgLst>
-</pc:chgInfo>
 </file>
 
 <file path=ppt/slideLayouts/slideLayout1.xml><?xml version="1.0" encoding="utf-8"?>
@@ -3653,6 +3507,14 @@
 <file path=ppt/slides/slide2.xml><?xml version="1.0" encoding="utf-8"?>
 <p:sld xmlns:a="http://schemas.openxmlformats.org/drawingml/2006/main" xmlns:r="http://schemas.openxmlformats.org/officeDocument/2006/relationships" xmlns:p="http://schemas.openxmlformats.org/presentationml/2006/main">
   <p:cSld>
+    <p:bg>
+      <p:bgPr>
+        <a:solidFill>
+          <a:schemeClr val="bg1"/>
+        </a:solidFill>
+        <a:effectLst/>
+      </p:bgPr>
+    </p:bg>
     <p:spTree>
       <p:nvGrpSpPr>
         <p:cNvPr id="1" name=""/>
@@ -3667,210 +3529,670 @@
           <a:chExt cx="0" cy="0"/>
         </a:xfrm>
       </p:grpSpPr>
-      <p:sp>
-        <p:nvSpPr>
-          <p:cNvPr id="2" name="Title 1">
-            <a:extLst>
-              <a:ext uri="{FF2B5EF4-FFF2-40B4-BE49-F238E27FC236}">
-                <a16:creationId xmlns:a16="http://schemas.microsoft.com/office/drawing/2014/main" id="{EA4BFAEC-7D3C-8591-5CD7-C227C70DC507}"/>
-              </a:ext>
-            </a:extLst>
-          </p:cNvPr>
-          <p:cNvSpPr>
-            <a:spLocks noGrp="1"/>
-          </p:cNvSpPr>
-          <p:nvPr>
-            <p:ph type="title"/>
+      <p:sp useBgFill="1">
+        <p:nvSpPr>
+          <p:cNvPr id="10" name="Rectangle 9">
+            <a:extLst>
+              <a:ext uri="{FF2B5EF4-FFF2-40B4-BE49-F238E27FC236}">
+                <a16:creationId xmlns:a16="http://schemas.microsoft.com/office/drawing/2014/main" id="{F13C74B1-5B17-4795-BED0-7140497B445A}"/>
+              </a:ext>
+              <a:ext uri="{C183D7F6-B498-43B3-948B-1728B52AA6E4}">
+                <adec:decorative xmlns:adec="http://schemas.microsoft.com/office/drawing/2017/decorative" val="1"/>
+              </a:ext>
+            </a:extLst>
+          </p:cNvPr>
+          <p:cNvSpPr>
+            <a:spLocks noGrp="1" noRot="1" noChangeAspect="1" noMove="1" noResize="1" noEditPoints="1" noAdjustHandles="1" noChangeArrowheads="1" noChangeShapeType="1" noTextEdit="1"/>
+          </p:cNvSpPr>
+          <p:nvPr>
+            <p:extLst>
+              <p:ext uri="{386F3935-93C4-4BCD-93E2-E3B085C9AB24}">
+                <p16:designElem xmlns:p16="http://schemas.microsoft.com/office/powerpoint/2015/main" val="1"/>
+              </p:ext>
+            </p:extLst>
           </p:nvPr>
         </p:nvSpPr>
         <p:spPr>
           <a:xfrm>
-            <a:off x="838200" y="0"/>
-            <a:ext cx="10515600" cy="1143635"/>
-          </a:xfrm>
-        </p:spPr>
-        <p:txBody>
-          <a:bodyPr>
-            <a:normAutofit/>
-          </a:bodyPr>
-          <a:lstStyle/>
-          <a:p>
-            <a:pPr algn="ctr"/>
-            <a:r>
-              <a:rPr lang="en-CA" sz="5400" b="1" dirty="0"/>
-              <a:t>Challenges when using these </a:t>
-            </a:r>
-            <a:r>
-              <a:rPr lang="en-CA" sz="5400" b="1" dirty="0" err="1"/>
-              <a:t>api’s</a:t>
-            </a:r>
-            <a:r>
-              <a:rPr lang="en-CA" sz="5400" b="1" dirty="0"/>
-              <a:t>:</a:t>
-            </a:r>
-          </a:p>
-        </p:txBody>
-      </p:sp>
-      <p:sp>
-        <p:nvSpPr>
-          <p:cNvPr id="3" name="Content Placeholder 2">
-            <a:extLst>
-              <a:ext uri="{FF2B5EF4-FFF2-40B4-BE49-F238E27FC236}">
-                <a16:creationId xmlns:a16="http://schemas.microsoft.com/office/drawing/2014/main" id="{D1DCA672-993F-D275-4E8F-DD32CC8308F6}"/>
-              </a:ext>
-            </a:extLst>
-          </p:cNvPr>
-          <p:cNvSpPr>
-            <a:spLocks noGrp="1"/>
-          </p:cNvSpPr>
-          <p:nvPr>
-            <p:ph idx="1"/>
-          </p:nvPr>
-        </p:nvSpPr>
-        <p:spPr>
-          <a:xfrm>
-            <a:off x="1021080" y="1036320"/>
-            <a:ext cx="10515600" cy="1994980"/>
-          </a:xfrm>
-        </p:spPr>
-        <p:txBody>
-          <a:bodyPr>
-            <a:normAutofit fontScale="92500" lnSpcReduction="20000"/>
-          </a:bodyPr>
-          <a:lstStyle/>
-          <a:p>
-            <a:pPr marL="0" indent="0">
-              <a:buNone/>
-            </a:pPr>
-            <a:r>
-              <a:rPr lang="en-CA" sz="4000" b="1" dirty="0"/>
-              <a:t>3 different endpoints to obtain weather data based on date ranges:</a:t>
-            </a:r>
-          </a:p>
-          <a:p>
-            <a:pPr marL="514350" indent="-514350">
-              <a:buAutoNum type="arabicPeriod"/>
-            </a:pPr>
-            <a:r>
-              <a:rPr lang="en-CA" sz="2000" dirty="0"/>
-              <a:t>Historical Weather (1940 – present)</a:t>
-            </a:r>
-          </a:p>
-          <a:p>
-            <a:pPr marL="514350" indent="-514350">
-              <a:buAutoNum type="arabicPeriod"/>
-            </a:pPr>
-            <a:r>
-              <a:rPr lang="en-CA" sz="2000" dirty="0"/>
-              <a:t>Current Forecast (present – 14 days)</a:t>
-            </a:r>
-          </a:p>
-          <a:p>
-            <a:pPr marL="0" indent="0">
-              <a:buNone/>
-            </a:pPr>
-            <a:r>
-              <a:rPr lang="en-CA" sz="2000" dirty="0"/>
-              <a:t>3.      Predicting Future Weather (14 days – 35 days)</a:t>
-            </a:r>
-          </a:p>
-        </p:txBody>
-      </p:sp>
-      <p:sp>
-        <p:nvSpPr>
-          <p:cNvPr id="4" name="TextBox 3">
-            <a:extLst>
-              <a:ext uri="{FF2B5EF4-FFF2-40B4-BE49-F238E27FC236}">
-                <a16:creationId xmlns:a16="http://schemas.microsoft.com/office/drawing/2014/main" id="{3EF7B583-9B8F-17FE-AF7D-4D1FC53077D2}"/>
-              </a:ext>
-            </a:extLst>
-          </p:cNvPr>
-          <p:cNvSpPr txBox="1"/>
-          <p:nvPr/>
-        </p:nvSpPr>
-        <p:spPr>
-          <a:xfrm>
-            <a:off x="1114816" y="3031300"/>
-            <a:ext cx="10238984" cy="3785652"/>
+            <a:off x="0" y="0"/>
+            <a:ext cx="12188952" cy="6858000"/>
           </a:xfrm>
           <a:prstGeom prst="rect">
             <a:avLst/>
           </a:prstGeom>
-          <a:noFill/>
+          <a:ln>
+            <a:noFill/>
+          </a:ln>
         </p:spPr>
-        <p:txBody>
-          <a:bodyPr wrap="square" rtlCol="0">
-            <a:spAutoFit/>
+        <p:style>
+          <a:lnRef idx="2">
+            <a:schemeClr val="accent1">
+              <a:shade val="50000"/>
+            </a:schemeClr>
+          </a:lnRef>
+          <a:fillRef idx="1">
+            <a:schemeClr val="accent1"/>
+          </a:fillRef>
+          <a:effectRef idx="0">
+            <a:schemeClr val="accent1"/>
+          </a:effectRef>
+          <a:fontRef idx="minor">
+            <a:schemeClr val="lt1"/>
+          </a:fontRef>
+        </p:style>
+        <p:txBody>
+          <a:bodyPr rtlCol="0" anchor="ctr"/>
+          <a:lstStyle/>
+          <a:p>
+            <a:pPr algn="ctr"/>
+            <a:endParaRPr lang="en-US"/>
+          </a:p>
+        </p:txBody>
+      </p:sp>
+      <p:sp>
+        <p:nvSpPr>
+          <p:cNvPr id="2" name="Title 1">
+            <a:extLst>
+              <a:ext uri="{FF2B5EF4-FFF2-40B4-BE49-F238E27FC236}">
+                <a16:creationId xmlns:a16="http://schemas.microsoft.com/office/drawing/2014/main" id="{1B6941CE-5F3F-9AB7-7203-80C5DB91F46B}"/>
+              </a:ext>
+            </a:extLst>
+          </p:cNvPr>
+          <p:cNvSpPr>
+            <a:spLocks noGrp="1"/>
+          </p:cNvSpPr>
+          <p:nvPr>
+            <p:ph type="title"/>
+          </p:nvPr>
+        </p:nvSpPr>
+        <p:spPr>
+          <a:xfrm>
+            <a:off x="640080" y="325369"/>
+            <a:ext cx="4368602" cy="1956841"/>
+          </a:xfrm>
+        </p:spPr>
+        <p:txBody>
+          <a:bodyPr anchor="b">
+            <a:normAutofit/>
           </a:bodyPr>
           <a:lstStyle/>
           <a:p>
             <a:r>
-              <a:rPr lang="en-CA" sz="4000" b="1" dirty="0"/>
-              <a:t>Limited and difficult input parameters:</a:t>
-            </a:r>
-          </a:p>
-          <a:p>
-            <a:r>
-              <a:rPr lang="en-CA" sz="2000" dirty="0"/>
-              <a:t>Location – only accepts one location in longitude and latitude</a:t>
-            </a:r>
-          </a:p>
-          <a:p>
-            <a:r>
-              <a:rPr lang="en-CA" sz="2000" dirty="0"/>
-              <a:t>Date Ranges – Can only be in the past, current forecast, or future (but not many)</a:t>
-            </a:r>
-          </a:p>
-          <a:p>
-            <a:r>
-              <a:rPr lang="en-CA" sz="2000" dirty="0"/>
-              <a:t>Stats – Limited to fixed time periods</a:t>
-            </a:r>
-          </a:p>
-          <a:p>
-            <a:endParaRPr lang="en-CA" sz="2000" dirty="0"/>
-          </a:p>
-          <a:p>
-            <a:r>
-              <a:rPr lang="en-CA" sz="4000" b="1" dirty="0"/>
-              <a:t>MORE</a:t>
-            </a:r>
-          </a:p>
-          <a:p>
-            <a:r>
-              <a:rPr lang="en-CA" sz="2000" dirty="0"/>
-              <a:t>JSON returned data – harder and messier to work with than a </a:t>
-            </a:r>
-            <a:r>
-              <a:rPr lang="en-CA" sz="2000" dirty="0" err="1"/>
-              <a:t>dataframe</a:t>
-            </a:r>
-            <a:r>
-              <a:rPr lang="en-CA" sz="2000" dirty="0"/>
-              <a:t> is</a:t>
-            </a:r>
-          </a:p>
-          <a:p>
-            <a:endParaRPr lang="en-CA" sz="2000" dirty="0"/>
-          </a:p>
-          <a:p>
-            <a:endParaRPr lang="en-CA" sz="2000" dirty="0"/>
-          </a:p>
-          <a:p>
-            <a:endParaRPr lang="en-CA" sz="2000" dirty="0"/>
-          </a:p>
-        </p:txBody>
-      </p:sp>
+              <a:rPr lang="en-CA" sz="5400" b="1" dirty="0"/>
+              <a:t>Why are we doing this?</a:t>
+            </a:r>
+          </a:p>
+        </p:txBody>
+      </p:sp>
+      <p:sp>
+        <p:nvSpPr>
+          <p:cNvPr id="12" name="sketchy line">
+            <a:extLst>
+              <a:ext uri="{FF2B5EF4-FFF2-40B4-BE49-F238E27FC236}">
+                <a16:creationId xmlns:a16="http://schemas.microsoft.com/office/drawing/2014/main" id="{D4974D33-8DC5-464E-8C6D-BE58F0669C17}"/>
+              </a:ext>
+              <a:ext uri="{C183D7F6-B498-43B3-948B-1728B52AA6E4}">
+                <adec:decorative xmlns:adec="http://schemas.microsoft.com/office/drawing/2017/decorative" val="1"/>
+              </a:ext>
+            </a:extLst>
+          </p:cNvPr>
+          <p:cNvSpPr>
+            <a:spLocks noGrp="1" noRot="1" noChangeAspect="1" noMove="1" noResize="1" noEditPoints="1" noAdjustHandles="1" noChangeArrowheads="1" noChangeShapeType="1" noTextEdit="1"/>
+          </p:cNvSpPr>
+          <p:nvPr>
+            <p:extLst>
+              <p:ext uri="{386F3935-93C4-4BCD-93E2-E3B085C9AB24}">
+                <p16:designElem xmlns:p16="http://schemas.microsoft.com/office/powerpoint/2015/main" val="1"/>
+              </p:ext>
+            </p:extLst>
+          </p:nvPr>
+        </p:nvSpPr>
+        <p:spPr>
+          <a:xfrm>
+            <a:off x="640080" y="2586994"/>
+            <a:ext cx="3474720" cy="18288"/>
+          </a:xfrm>
+          <a:custGeom>
+            <a:avLst/>
+            <a:gdLst>
+              <a:gd name="csX0" fmla="*/ 0 w 3474720"/>
+              <a:gd name="csY0" fmla="*/ 0 h 18288"/>
+              <a:gd name="csX1" fmla="*/ 694944 w 3474720"/>
+              <a:gd name="csY1" fmla="*/ 0 h 18288"/>
+              <a:gd name="csX2" fmla="*/ 1355141 w 3474720"/>
+              <a:gd name="csY2" fmla="*/ 0 h 18288"/>
+              <a:gd name="csX3" fmla="*/ 2015338 w 3474720"/>
+              <a:gd name="csY3" fmla="*/ 0 h 18288"/>
+              <a:gd name="csX4" fmla="*/ 2779776 w 3474720"/>
+              <a:gd name="csY4" fmla="*/ 0 h 18288"/>
+              <a:gd name="csX5" fmla="*/ 3474720 w 3474720"/>
+              <a:gd name="csY5" fmla="*/ 0 h 18288"/>
+              <a:gd name="csX6" fmla="*/ 3474720 w 3474720"/>
+              <a:gd name="csY6" fmla="*/ 18288 h 18288"/>
+              <a:gd name="csX7" fmla="*/ 2779776 w 3474720"/>
+              <a:gd name="csY7" fmla="*/ 18288 h 18288"/>
+              <a:gd name="csX8" fmla="*/ 2189074 w 3474720"/>
+              <a:gd name="csY8" fmla="*/ 18288 h 18288"/>
+              <a:gd name="csX9" fmla="*/ 1528877 w 3474720"/>
+              <a:gd name="csY9" fmla="*/ 18288 h 18288"/>
+              <a:gd name="csX10" fmla="*/ 868680 w 3474720"/>
+              <a:gd name="csY10" fmla="*/ 18288 h 18288"/>
+              <a:gd name="csX11" fmla="*/ 0 w 3474720"/>
+              <a:gd name="csY11" fmla="*/ 18288 h 18288"/>
+              <a:gd name="csX12" fmla="*/ 0 w 3474720"/>
+              <a:gd name="csY12" fmla="*/ 0 h 18288"/>
+            </a:gdLst>
+            <a:ahLst/>
+            <a:cxnLst>
+              <a:cxn ang="0">
+                <a:pos x="csX0" y="csY0"/>
+              </a:cxn>
+              <a:cxn ang="0">
+                <a:pos x="csX1" y="csY1"/>
+              </a:cxn>
+              <a:cxn ang="0">
+                <a:pos x="csX2" y="csY2"/>
+              </a:cxn>
+              <a:cxn ang="0">
+                <a:pos x="csX3" y="csY3"/>
+              </a:cxn>
+              <a:cxn ang="0">
+                <a:pos x="csX4" y="csY4"/>
+              </a:cxn>
+              <a:cxn ang="0">
+                <a:pos x="csX5" y="csY5"/>
+              </a:cxn>
+              <a:cxn ang="0">
+                <a:pos x="csX6" y="csY6"/>
+              </a:cxn>
+              <a:cxn ang="0">
+                <a:pos x="csX7" y="csY7"/>
+              </a:cxn>
+              <a:cxn ang="0">
+                <a:pos x="csX8" y="csY8"/>
+              </a:cxn>
+              <a:cxn ang="0">
+                <a:pos x="csX9" y="csY9"/>
+              </a:cxn>
+              <a:cxn ang="0">
+                <a:pos x="csX10" y="csY10"/>
+              </a:cxn>
+              <a:cxn ang="0">
+                <a:pos x="csX11" y="csY11"/>
+              </a:cxn>
+              <a:cxn ang="0">
+                <a:pos x="csX12" y="csY12"/>
+              </a:cxn>
+            </a:cxnLst>
+            <a:rect l="l" t="t" r="r" b="b"/>
+            <a:pathLst>
+              <a:path w="3474720" h="18288" fill="none" extrusionOk="0">
+                <a:moveTo>
+                  <a:pt x="0" y="0"/>
+                </a:moveTo>
+                <a:cubicBezTo>
+                  <a:pt x="224454" y="-14544"/>
+                  <a:pt x="495407" y="26540"/>
+                  <a:pt x="694944" y="0"/>
+                </a:cubicBezTo>
+                <a:cubicBezTo>
+                  <a:pt x="894481" y="-26540"/>
+                  <a:pt x="1130063" y="24713"/>
+                  <a:pt x="1355141" y="0"/>
+                </a:cubicBezTo>
+                <a:cubicBezTo>
+                  <a:pt x="1580219" y="-24713"/>
+                  <a:pt x="1820099" y="26695"/>
+                  <a:pt x="2015338" y="0"/>
+                </a:cubicBezTo>
+                <a:cubicBezTo>
+                  <a:pt x="2210577" y="-26695"/>
+                  <a:pt x="2402045" y="165"/>
+                  <a:pt x="2779776" y="0"/>
+                </a:cubicBezTo>
+                <a:cubicBezTo>
+                  <a:pt x="3157507" y="-165"/>
+                  <a:pt x="3286859" y="-15571"/>
+                  <a:pt x="3474720" y="0"/>
+                </a:cubicBezTo>
+                <a:cubicBezTo>
+                  <a:pt x="3474286" y="7551"/>
+                  <a:pt x="3474253" y="9822"/>
+                  <a:pt x="3474720" y="18288"/>
+                </a:cubicBezTo>
+                <a:cubicBezTo>
+                  <a:pt x="3233904" y="29845"/>
+                  <a:pt x="2945134" y="-5256"/>
+                  <a:pt x="2779776" y="18288"/>
+                </a:cubicBezTo>
+                <a:cubicBezTo>
+                  <a:pt x="2614418" y="41832"/>
+                  <a:pt x="2339768" y="22709"/>
+                  <a:pt x="2189074" y="18288"/>
+                </a:cubicBezTo>
+                <a:cubicBezTo>
+                  <a:pt x="2038380" y="13867"/>
+                  <a:pt x="1817434" y="-4947"/>
+                  <a:pt x="1528877" y="18288"/>
+                </a:cubicBezTo>
+                <a:cubicBezTo>
+                  <a:pt x="1240320" y="41523"/>
+                  <a:pt x="1042447" y="37198"/>
+                  <a:pt x="868680" y="18288"/>
+                </a:cubicBezTo>
+                <a:cubicBezTo>
+                  <a:pt x="694913" y="-622"/>
+                  <a:pt x="233232" y="44909"/>
+                  <a:pt x="0" y="18288"/>
+                </a:cubicBezTo>
+                <a:cubicBezTo>
+                  <a:pt x="60" y="11696"/>
+                  <a:pt x="66" y="3758"/>
+                  <a:pt x="0" y="0"/>
+                </a:cubicBezTo>
+                <a:close/>
+              </a:path>
+              <a:path w="3474720" h="18288" stroke="0" extrusionOk="0">
+                <a:moveTo>
+                  <a:pt x="0" y="0"/>
+                </a:moveTo>
+                <a:cubicBezTo>
+                  <a:pt x="202328" y="-14716"/>
+                  <a:pt x="332722" y="-11499"/>
+                  <a:pt x="625450" y="0"/>
+                </a:cubicBezTo>
+                <a:cubicBezTo>
+                  <a:pt x="918178" y="11499"/>
+                  <a:pt x="1096688" y="5123"/>
+                  <a:pt x="1389888" y="0"/>
+                </a:cubicBezTo>
+                <a:cubicBezTo>
+                  <a:pt x="1683088" y="-5123"/>
+                  <a:pt x="1835981" y="-14038"/>
+                  <a:pt x="1980590" y="0"/>
+                </a:cubicBezTo>
+                <a:cubicBezTo>
+                  <a:pt x="2125199" y="14038"/>
+                  <a:pt x="2396099" y="-7203"/>
+                  <a:pt x="2571293" y="0"/>
+                </a:cubicBezTo>
+                <a:cubicBezTo>
+                  <a:pt x="2746487" y="7203"/>
+                  <a:pt x="3041609" y="-12036"/>
+                  <a:pt x="3474720" y="0"/>
+                </a:cubicBezTo>
+                <a:cubicBezTo>
+                  <a:pt x="3474638" y="4406"/>
+                  <a:pt x="3474631" y="9982"/>
+                  <a:pt x="3474720" y="18288"/>
+                </a:cubicBezTo>
+                <a:cubicBezTo>
+                  <a:pt x="3324873" y="21876"/>
+                  <a:pt x="3136771" y="12587"/>
+                  <a:pt x="2814523" y="18288"/>
+                </a:cubicBezTo>
+                <a:cubicBezTo>
+                  <a:pt x="2492275" y="23989"/>
+                  <a:pt x="2294402" y="47111"/>
+                  <a:pt x="2154326" y="18288"/>
+                </a:cubicBezTo>
+                <a:cubicBezTo>
+                  <a:pt x="2014250" y="-10535"/>
+                  <a:pt x="1820317" y="33903"/>
+                  <a:pt x="1494130" y="18288"/>
+                </a:cubicBezTo>
+                <a:cubicBezTo>
+                  <a:pt x="1167943" y="2673"/>
+                  <a:pt x="948432" y="14868"/>
+                  <a:pt x="729691" y="18288"/>
+                </a:cubicBezTo>
+                <a:cubicBezTo>
+                  <a:pt x="510950" y="21708"/>
+                  <a:pt x="264032" y="24354"/>
+                  <a:pt x="0" y="18288"/>
+                </a:cubicBezTo>
+                <a:cubicBezTo>
+                  <a:pt x="189" y="14288"/>
+                  <a:pt x="-703" y="3747"/>
+                  <a:pt x="0" y="0"/>
+                </a:cubicBezTo>
+                <a:close/>
+              </a:path>
+            </a:pathLst>
+          </a:custGeom>
+          <a:solidFill>
+            <a:schemeClr val="accent2"/>
+          </a:solidFill>
+          <a:ln w="44450" cap="rnd">
+            <a:solidFill>
+              <a:schemeClr val="accent2"/>
+            </a:solidFill>
+            <a:round/>
+            <a:extLst>
+              <a:ext uri="{C807C97D-BFC1-408E-A445-0C87EB9F89A2}">
+                <ask:lineSketchStyleProps xmlns:ask="http://schemas.microsoft.com/office/drawing/2018/sketchyshapes" sd="2863741219">
+                  <a:prstGeom prst="rect">
+                    <a:avLst/>
+                  </a:prstGeom>
+                  <ask:type>
+                    <ask:lineSketchFreehand/>
+                  </ask:type>
+                </ask:lineSketchStyleProps>
+              </a:ext>
+            </a:extLst>
+          </a:ln>
+        </p:spPr>
+        <p:style>
+          <a:lnRef idx="2">
+            <a:schemeClr val="accent1">
+              <a:shade val="50000"/>
+            </a:schemeClr>
+          </a:lnRef>
+          <a:fillRef idx="1">
+            <a:schemeClr val="accent1"/>
+          </a:fillRef>
+          <a:effectRef idx="0">
+            <a:schemeClr val="accent1"/>
+          </a:effectRef>
+          <a:fontRef idx="minor">
+            <a:schemeClr val="lt1"/>
+          </a:fontRef>
+        </p:style>
+        <p:txBody>
+          <a:bodyPr rtlCol="0" anchor="ctr"/>
+          <a:lstStyle/>
+          <a:p>
+            <a:pPr algn="ctr"/>
+            <a:endParaRPr lang="en-US"/>
+          </a:p>
+        </p:txBody>
+      </p:sp>
+      <p:sp>
+        <p:nvSpPr>
+          <p:cNvPr id="3" name="Content Placeholder 2">
+            <a:extLst>
+              <a:ext uri="{FF2B5EF4-FFF2-40B4-BE49-F238E27FC236}">
+                <a16:creationId xmlns:a16="http://schemas.microsoft.com/office/drawing/2014/main" id="{2C7458CB-1446-EBAA-2CD8-D7E849672D31}"/>
+              </a:ext>
+            </a:extLst>
+          </p:cNvPr>
+          <p:cNvSpPr>
+            <a:spLocks noGrp="1"/>
+          </p:cNvSpPr>
+          <p:nvPr>
+            <p:ph idx="1"/>
+          </p:nvPr>
+        </p:nvSpPr>
+        <p:spPr>
+          <a:xfrm>
+            <a:off x="640080" y="2872899"/>
+            <a:ext cx="4243589" cy="3320668"/>
+          </a:xfrm>
+        </p:spPr>
+        <p:txBody>
+          <a:bodyPr>
+            <a:normAutofit/>
+          </a:bodyPr>
+          <a:lstStyle/>
+          <a:p>
+            <a:r>
+              <a:rPr lang="en-CA" sz="2200" dirty="0"/>
+              <a:t>To get the marks</a:t>
+            </a:r>
+          </a:p>
+        </p:txBody>
+      </p:sp>
+      <p:pic>
+        <p:nvPicPr>
+          <p:cNvPr id="5" name="Picture 4">
+            <a:extLst>
+              <a:ext uri="{FF2B5EF4-FFF2-40B4-BE49-F238E27FC236}">
+                <a16:creationId xmlns:a16="http://schemas.microsoft.com/office/drawing/2014/main" id="{EB2B4AFB-789D-02FD-BC0C-64EC20FC0AE2}"/>
+              </a:ext>
+            </a:extLst>
+          </p:cNvPr>
+          <p:cNvPicPr>
+            <a:picLocks noChangeAspect="1"/>
+          </p:cNvPicPr>
+          <p:nvPr/>
+        </p:nvPicPr>
+        <p:blipFill>
+          <a:blip r:embed="rId2">
+            <a:extLst>
+              <a:ext uri="{28A0092B-C50C-407E-A947-70E740481C1C}">
+                <a14:useLocalDpi xmlns:a14="http://schemas.microsoft.com/office/drawing/2010/main" val="0"/>
+              </a:ext>
+            </a:extLst>
+          </a:blip>
+          <a:srcRect l="6001" r="11753" b="2"/>
+          <a:stretch>
+            <a:fillRect/>
+          </a:stretch>
+        </p:blipFill>
+        <p:spPr>
+          <a:xfrm>
+            <a:off x="5311702" y="10"/>
+            <a:ext cx="6878775" cy="6857990"/>
+          </a:xfrm>
+          <a:custGeom>
+            <a:avLst/>
+            <a:gdLst/>
+            <a:ahLst/>
+            <a:cxnLst/>
+            <a:rect l="l" t="t" r="r" b="b"/>
+            <a:pathLst>
+              <a:path w="6878775" h="6858000">
+                <a:moveTo>
+                  <a:pt x="1102973" y="0"/>
+                </a:moveTo>
+                <a:lnTo>
+                  <a:pt x="1160688" y="0"/>
+                </a:lnTo>
+                <a:lnTo>
+                  <a:pt x="983189" y="331786"/>
+                </a:lnTo>
+                <a:cubicBezTo>
+                  <a:pt x="914866" y="469145"/>
+                  <a:pt x="850355" y="608712"/>
+                  <a:pt x="789261" y="750263"/>
+                </a:cubicBezTo>
+                <a:cubicBezTo>
+                  <a:pt x="774307" y="784928"/>
+                  <a:pt x="759992" y="819849"/>
+                  <a:pt x="745295" y="854514"/>
+                </a:cubicBezTo>
+                <a:cubicBezTo>
+                  <a:pt x="756682" y="845393"/>
+                  <a:pt x="765489" y="833492"/>
+                  <a:pt x="770857" y="819975"/>
+                </a:cubicBezTo>
+                <a:cubicBezTo>
+                  <a:pt x="879943" y="589569"/>
+                  <a:pt x="999605" y="365513"/>
+                  <a:pt x="1131329" y="148742"/>
+                </a:cubicBezTo>
+                <a:lnTo>
+                  <a:pt x="1227589" y="0"/>
+                </a:lnTo>
+                <a:lnTo>
+                  <a:pt x="6878775" y="0"/>
+                </a:lnTo>
+                <a:lnTo>
+                  <a:pt x="6878775" y="6858000"/>
+                </a:lnTo>
+                <a:lnTo>
+                  <a:pt x="713521" y="6858000"/>
+                </a:lnTo>
+                <a:lnTo>
+                  <a:pt x="625642" y="6670527"/>
+                </a:lnTo>
+                <a:cubicBezTo>
+                  <a:pt x="507232" y="6398531"/>
+                  <a:pt x="403083" y="6118381"/>
+                  <a:pt x="312785" y="5830359"/>
+                </a:cubicBezTo>
+                <a:cubicBezTo>
+                  <a:pt x="278149" y="5719759"/>
+                  <a:pt x="248879" y="5607635"/>
+                  <a:pt x="212198" y="5480401"/>
+                </a:cubicBezTo>
+                <a:cubicBezTo>
+                  <a:pt x="212208" y="5491601"/>
+                  <a:pt x="212803" y="5502788"/>
+                  <a:pt x="213988" y="5513923"/>
+                </a:cubicBezTo>
+                <a:cubicBezTo>
+                  <a:pt x="264089" y="5723695"/>
+                  <a:pt x="307290" y="5935370"/>
+                  <a:pt x="365826" y="6142729"/>
+                </a:cubicBezTo>
+                <a:cubicBezTo>
+                  <a:pt x="433152" y="6380817"/>
+                  <a:pt x="510068" y="6614016"/>
+                  <a:pt x="597975" y="6841549"/>
+                </a:cubicBezTo>
+                <a:lnTo>
+                  <a:pt x="604824" y="6858000"/>
+                </a:lnTo>
+                <a:lnTo>
+                  <a:pt x="552056" y="6858000"/>
+                </a:lnTo>
+                <a:lnTo>
+                  <a:pt x="539576" y="6828295"/>
+                </a:lnTo>
+                <a:cubicBezTo>
+                  <a:pt x="380597" y="6414594"/>
+                  <a:pt x="260223" y="5988893"/>
+                  <a:pt x="171555" y="5552906"/>
+                </a:cubicBezTo>
+                <a:cubicBezTo>
+                  <a:pt x="91163" y="5157998"/>
+                  <a:pt x="43746" y="4758899"/>
+                  <a:pt x="12305" y="4357388"/>
+                </a:cubicBezTo>
+                <a:cubicBezTo>
+                  <a:pt x="-14281" y="4013908"/>
+                  <a:pt x="4507" y="3672965"/>
+                  <a:pt x="46684" y="3331516"/>
+                </a:cubicBezTo>
+                <a:cubicBezTo>
+                  <a:pt x="127203" y="2664286"/>
+                  <a:pt x="277819" y="2007265"/>
+                  <a:pt x="496065" y="1371196"/>
+                </a:cubicBezTo>
+                <a:cubicBezTo>
+                  <a:pt x="636273" y="966066"/>
+                  <a:pt x="800445" y="573253"/>
+                  <a:pt x="995723" y="196614"/>
+                </a:cubicBezTo>
+                <a:close/>
+              </a:path>
+            </a:pathLst>
+          </a:custGeom>
+        </p:spPr>
+      </p:pic>
     </p:spTree>
     <p:extLst>
       <p:ext uri="{BB962C8B-B14F-4D97-AF65-F5344CB8AC3E}">
-        <p14:creationId xmlns:p14="http://schemas.microsoft.com/office/powerpoint/2010/main" val="336276173"/>
+        <p14:creationId xmlns:p14="http://schemas.microsoft.com/office/powerpoint/2010/main" val="2754418743"/>
       </p:ext>
     </p:extLst>
   </p:cSld>
   <p:clrMapOvr>
     <a:masterClrMapping/>
   </p:clrMapOvr>
+  <p:timing>
+    <p:tnLst>
+      <p:par>
+        <p:cTn id="1" dur="indefinite" restart="never" nodeType="tmRoot">
+          <p:childTnLst>
+            <p:seq concurrent="1" nextAc="seek">
+              <p:cTn id="2" dur="indefinite" nodeType="mainSeq">
+                <p:childTnLst>
+                  <p:par>
+                    <p:cTn id="3" fill="hold">
+                      <p:stCondLst>
+                        <p:cond delay="indefinite"/>
+                        <p:cond evt="onBegin" delay="0">
+                          <p:tn val="2"/>
+                        </p:cond>
+                      </p:stCondLst>
+                      <p:childTnLst>
+                        <p:par>
+                          <p:cTn id="4" fill="hold">
+                            <p:stCondLst>
+                              <p:cond delay="0"/>
+                            </p:stCondLst>
+                            <p:childTnLst>
+                              <p:par>
+                                <p:cTn id="5" presetID="10" presetClass="entr" presetSubtype="0" fill="hold" grpId="0" nodeType="withEffect">
+                                  <p:stCondLst>
+                                    <p:cond delay="1000"/>
+                                  </p:stCondLst>
+                                  <p:iterate>
+                                    <p:tmPct val="10000"/>
+                                  </p:iterate>
+                                  <p:childTnLst>
+                                    <p:set>
+                                      <p:cBhvr>
+                                        <p:cTn id="6" dur="1" fill="hold">
+                                          <p:stCondLst>
+                                            <p:cond delay="0"/>
+                                          </p:stCondLst>
+                                        </p:cTn>
+                                        <p:tgtEl>
+                                          <p:spTgt spid="2"/>
+                                        </p:tgtEl>
+                                        <p:attrNameLst>
+                                          <p:attrName>style.visibility</p:attrName>
+                                        </p:attrNameLst>
+                                      </p:cBhvr>
+                                      <p:to>
+                                        <p:strVal val="visible"/>
+                                      </p:to>
+                                    </p:set>
+                                    <p:animEffect transition="in" filter="fade">
+                                      <p:cBhvr>
+                                        <p:cTn id="7" dur="700"/>
+                                        <p:tgtEl>
+                                          <p:spTgt spid="2"/>
+                                        </p:tgtEl>
+                                      </p:cBhvr>
+                                    </p:animEffect>
+                                  </p:childTnLst>
+                                </p:cTn>
+                              </p:par>
+                            </p:childTnLst>
+                          </p:cTn>
+                        </p:par>
+                      </p:childTnLst>
+                    </p:cTn>
+                  </p:par>
+                </p:childTnLst>
+              </p:cTn>
+              <p:prevCondLst>
+                <p:cond evt="onPrev" delay="0">
+                  <p:tgtEl>
+                    <p:sldTgt/>
+                  </p:tgtEl>
+                </p:cond>
+              </p:prevCondLst>
+              <p:nextCondLst>
+                <p:cond evt="onNext" delay="0">
+                  <p:tgtEl>
+                    <p:sldTgt/>
+                  </p:tgtEl>
+                </p:cond>
+              </p:nextCondLst>
+            </p:seq>
+          </p:childTnLst>
+        </p:cTn>
+      </p:par>
+    </p:tnLst>
+    <p:bldLst>
+      <p:bldP spid="2" grpId="0"/>
+    </p:bldLst>
+  </p:timing>
 </p:sld>
 </file>
 
@@ -3896,7 +4218,7 @@
           <p:cNvPr id="2" name="Title 1">
             <a:extLst>
               <a:ext uri="{FF2B5EF4-FFF2-40B4-BE49-F238E27FC236}">
-                <a16:creationId xmlns:a16="http://schemas.microsoft.com/office/drawing/2014/main" id="{6DFB0C81-E219-E4E3-548E-360290808770}"/>
+                <a16:creationId xmlns:a16="http://schemas.microsoft.com/office/drawing/2014/main" id="{EA4BFAEC-7D3C-8591-5CD7-C227C70DC507}"/>
               </a:ext>
             </a:extLst>
           </p:cNvPr>
@@ -3909,8 +4231,8 @@
         </p:nvSpPr>
         <p:spPr>
           <a:xfrm>
-            <a:off x="838200" y="18255"/>
-            <a:ext cx="10515600" cy="1325563"/>
+            <a:off x="838200" y="0"/>
+            <a:ext cx="10515600" cy="1143635"/>
           </a:xfrm>
         </p:spPr>
         <p:txBody>
@@ -3921,8 +4243,8 @@
           <a:p>
             <a:pPr algn="ctr"/>
             <a:r>
-              <a:rPr lang="en-CA" sz="6600" b="1" dirty="0"/>
-              <a:t>Our Solution</a:t>
+              <a:rPr lang="en-CA" sz="5400" b="1" dirty="0"/>
+              <a:t>Challenges when using these API’s:</a:t>
             </a:r>
           </a:p>
         </p:txBody>
@@ -3932,7 +4254,7 @@
           <p:cNvPr id="3" name="Content Placeholder 2">
             <a:extLst>
               <a:ext uri="{FF2B5EF4-FFF2-40B4-BE49-F238E27FC236}">
-                <a16:creationId xmlns:a16="http://schemas.microsoft.com/office/drawing/2014/main" id="{EAA93609-261F-FBB6-A5FC-02C369379B9C}"/>
+                <a16:creationId xmlns:a16="http://schemas.microsoft.com/office/drawing/2014/main" id="{D1DCA672-993F-D275-4E8F-DD32CC8308F6}"/>
               </a:ext>
             </a:extLst>
           </p:cNvPr>
@@ -3945,103 +4267,134 @@
         </p:nvSpPr>
         <p:spPr>
           <a:xfrm>
-            <a:off x="838200" y="1063624"/>
-            <a:ext cx="10515600" cy="5169535"/>
+            <a:off x="1021080" y="1036320"/>
+            <a:ext cx="10515600" cy="1994980"/>
           </a:xfrm>
         </p:spPr>
         <p:txBody>
           <a:bodyPr>
-            <a:normAutofit/>
+            <a:normAutofit fontScale="92500" lnSpcReduction="20000"/>
           </a:bodyPr>
           <a:lstStyle/>
           <a:p>
-            <a:r>
-              <a:rPr lang="en-CA" dirty="0"/>
-              <a:t>A catch all function </a:t>
-            </a:r>
-            <a:r>
-              <a:rPr lang="en-CA" b="1" dirty="0" err="1"/>
-              <a:t>weather.range</a:t>
-            </a:r>
-            <a:r>
-              <a:rPr lang="en-CA" b="1" dirty="0"/>
-              <a:t>(charts, </a:t>
-            </a:r>
-            <a:r>
-              <a:rPr lang="en-CA" b="1" dirty="0" err="1"/>
-              <a:t>rangeStart</a:t>
-            </a:r>
-            <a:r>
-              <a:rPr lang="en-CA" b="1" dirty="0"/>
-              <a:t>, </a:t>
-            </a:r>
-            <a:r>
-              <a:rPr lang="en-CA" b="1" dirty="0" err="1"/>
-              <a:t>rangeEnd</a:t>
-            </a:r>
-            <a:r>
-              <a:rPr lang="en-CA" b="1" dirty="0"/>
-              <a:t>, interval, locations = [], metrics = [], stats = [], </a:t>
-            </a:r>
-            <a:r>
-              <a:rPr lang="en-CA" b="1" dirty="0" err="1"/>
-              <a:t>stat_interval</a:t>
-            </a:r>
-            <a:r>
-              <a:rPr lang="en-CA" b="1" dirty="0"/>
-              <a:t>, </a:t>
-            </a:r>
-            <a:r>
-              <a:rPr lang="en-CA" b="1" dirty="0" err="1"/>
-              <a:t>timezone</a:t>
-            </a:r>
-            <a:r>
-              <a:rPr lang="en-CA" b="1" dirty="0"/>
-              <a:t>) </a:t>
-            </a:r>
-            <a:r>
-              <a:rPr lang="en-CA" dirty="0"/>
-              <a:t>to wrap all 3 of the endpoints into one, returning the weather data over any time range as a clean data frame.</a:t>
-            </a:r>
-          </a:p>
-          <a:p>
-            <a:r>
-              <a:rPr lang="en-CA" dirty="0"/>
-              <a:t>Allows multiple input locations and in address, city or long/</a:t>
-            </a:r>
-            <a:r>
-              <a:rPr lang="en-CA" dirty="0" err="1"/>
-              <a:t>lat</a:t>
-            </a:r>
-            <a:r>
-              <a:rPr lang="en-CA" dirty="0"/>
-              <a:t> format</a:t>
-            </a:r>
-          </a:p>
-          <a:p>
-            <a:r>
-              <a:rPr lang="en-CA" dirty="0"/>
-              <a:t>Allows any stat ranges</a:t>
-            </a:r>
-          </a:p>
-          <a:p>
-            <a:r>
-              <a:rPr lang="en-CA" dirty="0"/>
-              <a:t>Allows time ranges to be any combination of past, current or future dates</a:t>
-            </a:r>
-          </a:p>
-          <a:p>
-            <a:r>
-              <a:rPr lang="en-CA" dirty="0"/>
-              <a:t>Much easier to use function params than endpoint params </a:t>
-            </a:r>
+            <a:pPr marL="0" indent="0">
+              <a:buNone/>
+            </a:pPr>
+            <a:r>
+              <a:rPr lang="en-CA" sz="4000" b="1" dirty="0"/>
+              <a:t>3 different endpoints to obtain weather data based on date ranges:</a:t>
+            </a:r>
+          </a:p>
+          <a:p>
+            <a:pPr marL="514350" indent="-514350">
+              <a:buAutoNum type="arabicPeriod"/>
+            </a:pPr>
+            <a:r>
+              <a:rPr lang="en-CA" sz="2000" dirty="0"/>
+              <a:t>Historical Weather (1940 – present)</a:t>
+            </a:r>
+          </a:p>
+          <a:p>
+            <a:pPr marL="514350" indent="-514350">
+              <a:buAutoNum type="arabicPeriod"/>
+            </a:pPr>
+            <a:r>
+              <a:rPr lang="en-CA" sz="2000" dirty="0"/>
+              <a:t>Current Forecast (present – 14 days)</a:t>
+            </a:r>
+          </a:p>
+          <a:p>
+            <a:pPr marL="0" indent="0">
+              <a:buNone/>
+            </a:pPr>
+            <a:r>
+              <a:rPr lang="en-CA" sz="2000" dirty="0"/>
+              <a:t>3.      Predicting Future Weather (14 days – 35 days)</a:t>
+            </a:r>
+          </a:p>
+        </p:txBody>
+      </p:sp>
+      <p:sp>
+        <p:nvSpPr>
+          <p:cNvPr id="4" name="TextBox 3">
+            <a:extLst>
+              <a:ext uri="{FF2B5EF4-FFF2-40B4-BE49-F238E27FC236}">
+                <a16:creationId xmlns:a16="http://schemas.microsoft.com/office/drawing/2014/main" id="{3EF7B583-9B8F-17FE-AF7D-4D1FC53077D2}"/>
+              </a:ext>
+            </a:extLst>
+          </p:cNvPr>
+          <p:cNvSpPr txBox="1"/>
+          <p:nvPr/>
+        </p:nvSpPr>
+        <p:spPr>
+          <a:xfrm>
+            <a:off x="1114816" y="3031300"/>
+            <a:ext cx="10238984" cy="3785652"/>
+          </a:xfrm>
+          <a:prstGeom prst="rect">
+            <a:avLst/>
+          </a:prstGeom>
+          <a:noFill/>
+        </p:spPr>
+        <p:txBody>
+          <a:bodyPr wrap="square" rtlCol="0">
+            <a:spAutoFit/>
+          </a:bodyPr>
+          <a:lstStyle/>
+          <a:p>
+            <a:r>
+              <a:rPr lang="en-CA" sz="4000" b="1" dirty="0"/>
+              <a:t>Limited and difficult input parameters:</a:t>
+            </a:r>
+          </a:p>
+          <a:p>
+            <a:r>
+              <a:rPr lang="en-CA" sz="2000" dirty="0"/>
+              <a:t>Location – only accepts location in longitude and latitude</a:t>
+            </a:r>
+          </a:p>
+          <a:p>
+            <a:r>
+              <a:rPr lang="en-CA" sz="2000" dirty="0"/>
+              <a:t>Date Ranges – Can only be in the past, current forecast, or future (but not many)</a:t>
+            </a:r>
+          </a:p>
+          <a:p>
+            <a:r>
+              <a:rPr lang="en-CA" sz="2000" dirty="0"/>
+              <a:t>Stats – Limited to fixed time periods</a:t>
+            </a:r>
+          </a:p>
+          <a:p>
+            <a:endParaRPr lang="en-CA" sz="2000" dirty="0"/>
+          </a:p>
+          <a:p>
+            <a:r>
+              <a:rPr lang="en-CA" sz="4000" b="1" dirty="0"/>
+              <a:t>MORE</a:t>
+            </a:r>
+          </a:p>
+          <a:p>
+            <a:r>
+              <a:rPr lang="en-CA" sz="2000" dirty="0"/>
+              <a:t>JSON returned data – harder and messier to work with than a data frame is</a:t>
+            </a:r>
+          </a:p>
+          <a:p>
+            <a:endParaRPr lang="en-CA" sz="2000" dirty="0"/>
+          </a:p>
+          <a:p>
+            <a:endParaRPr lang="en-CA" sz="2000" dirty="0"/>
+          </a:p>
+          <a:p>
+            <a:endParaRPr lang="en-CA" sz="2000" dirty="0"/>
           </a:p>
         </p:txBody>
       </p:sp>
     </p:spTree>
     <p:extLst>
       <p:ext uri="{BB962C8B-B14F-4D97-AF65-F5344CB8AC3E}">
-        <p14:creationId xmlns:p14="http://schemas.microsoft.com/office/powerpoint/2010/main" val="60825484"/>
+        <p14:creationId xmlns:p14="http://schemas.microsoft.com/office/powerpoint/2010/main" val="336276173"/>
       </p:ext>
     </p:extLst>
   </p:cSld>
@@ -4054,6 +4407,14 @@
 <file path=ppt/slides/slide4.xml><?xml version="1.0" encoding="utf-8"?>
 <p:sld xmlns:a="http://schemas.openxmlformats.org/drawingml/2006/main" xmlns:r="http://schemas.openxmlformats.org/officeDocument/2006/relationships" xmlns:p="http://schemas.openxmlformats.org/presentationml/2006/main">
   <p:cSld>
+    <p:bg>
+      <p:bgPr>
+        <a:solidFill>
+          <a:schemeClr val="bg1"/>
+        </a:solidFill>
+        <a:effectLst/>
+      </p:bgPr>
+    </p:bg>
     <p:spTree>
       <p:nvGrpSpPr>
         <p:cNvPr id="1" name=""/>
@@ -4068,121 +4429,76 @@
           <a:chExt cx="0" cy="0"/>
         </a:xfrm>
       </p:grpSpPr>
-      <p:sp>
-        <p:nvSpPr>
-          <p:cNvPr id="2" name="Title 1">
-            <a:extLst>
-              <a:ext uri="{FF2B5EF4-FFF2-40B4-BE49-F238E27FC236}">
-                <a16:creationId xmlns:a16="http://schemas.microsoft.com/office/drawing/2014/main" id="{38B4628B-8EB3-E9EB-F455-F7AAEB847B9E}"/>
-              </a:ext>
-            </a:extLst>
-          </p:cNvPr>
-          <p:cNvSpPr>
-            <a:spLocks noGrp="1"/>
-          </p:cNvSpPr>
-          <p:nvPr>
-            <p:ph type="title"/>
-          </p:nvPr>
-        </p:nvSpPr>
+      <p:pic>
+        <p:nvPicPr>
+          <p:cNvPr id="8" name="Content Placeholder 7">
+            <a:extLst>
+              <a:ext uri="{FF2B5EF4-FFF2-40B4-BE49-F238E27FC236}">
+                <a16:creationId xmlns:a16="http://schemas.microsoft.com/office/drawing/2014/main" id="{59966E8C-65FA-A106-F20C-8AA8C7B3C618}"/>
+              </a:ext>
+            </a:extLst>
+          </p:cNvPr>
+          <p:cNvPicPr>
+            <a:picLocks noGrp="1" noChangeAspect="1"/>
+          </p:cNvPicPr>
+          <p:nvPr>
+            <p:ph idx="1"/>
+          </p:nvPr>
+        </p:nvPicPr>
+        <p:blipFill>
+          <a:blip r:embed="rId2">
+            <a:extLst>
+              <a:ext uri="{28A0092B-C50C-407E-A947-70E740481C1C}">
+                <a14:useLocalDpi xmlns:a14="http://schemas.microsoft.com/office/drawing/2010/main" val="0"/>
+              </a:ext>
+            </a:extLst>
+          </a:blip>
+          <a:stretch>
+            <a:fillRect/>
+          </a:stretch>
+        </p:blipFill>
         <p:spPr>
           <a:xfrm>
-            <a:off x="838200" y="365125"/>
-            <a:ext cx="10515600" cy="838835"/>
+            <a:off x="909742" y="1006361"/>
+            <a:ext cx="10372516" cy="5160325"/>
           </a:xfrm>
+          <a:prstGeom prst="rect">
+            <a:avLst/>
+          </a:prstGeom>
         </p:spPr>
-        <p:txBody>
-          <a:bodyPr>
-            <a:normAutofit/>
-          </a:bodyPr>
-          <a:lstStyle/>
-          <a:p>
-            <a:pPr algn="ctr"/>
-            <a:r>
-              <a:rPr lang="en-CA" sz="4800" b="1" dirty="0"/>
-              <a:t>EXTRAS</a:t>
-            </a:r>
-          </a:p>
-        </p:txBody>
-      </p:sp>
-      <p:sp>
-        <p:nvSpPr>
-          <p:cNvPr id="3" name="Content Placeholder 2">
-            <a:extLst>
-              <a:ext uri="{FF2B5EF4-FFF2-40B4-BE49-F238E27FC236}">
-                <a16:creationId xmlns:a16="http://schemas.microsoft.com/office/drawing/2014/main" id="{542B5D9C-FA30-10AF-D7C7-D6ED3DFAECC6}"/>
-              </a:ext>
-            </a:extLst>
-          </p:cNvPr>
-          <p:cNvSpPr>
-            <a:spLocks noGrp="1"/>
-          </p:cNvSpPr>
-          <p:nvPr>
-            <p:ph idx="1"/>
-          </p:nvPr>
+      </p:pic>
+      <p:sp>
+        <p:nvSpPr>
+          <p:cNvPr id="9" name="TextBox 8">
+            <a:extLst>
+              <a:ext uri="{FF2B5EF4-FFF2-40B4-BE49-F238E27FC236}">
+                <a16:creationId xmlns:a16="http://schemas.microsoft.com/office/drawing/2014/main" id="{1A363C97-D69D-F4D0-A21C-0937AC66F645}"/>
+              </a:ext>
+            </a:extLst>
+          </p:cNvPr>
+          <p:cNvSpPr txBox="1"/>
+          <p:nvPr/>
         </p:nvSpPr>
         <p:spPr>
           <a:xfrm>
-            <a:off x="838200" y="1520825"/>
-            <a:ext cx="10515600" cy="4351338"/>
+            <a:off x="1415441" y="175364"/>
+            <a:ext cx="8817858" cy="830997"/>
           </a:xfrm>
+          <a:prstGeom prst="rect">
+            <a:avLst/>
+          </a:prstGeom>
+          <a:noFill/>
         </p:spPr>
         <p:txBody>
-          <a:bodyPr/>
-          <a:lstStyle/>
-          <a:p>
-            <a:r>
-              <a:rPr lang="en-CA" dirty="0"/>
-              <a:t>Simplified versions of the catch all date range function will be provided, like </a:t>
-            </a:r>
-            <a:r>
-              <a:rPr lang="en-CA" b="1" dirty="0" err="1"/>
-              <a:t>weather.forecast</a:t>
-            </a:r>
-            <a:r>
-              <a:rPr lang="en-CA" b="1" dirty="0"/>
-              <a:t>() </a:t>
-            </a:r>
-            <a:r>
-              <a:rPr lang="en-CA" dirty="0"/>
-              <a:t>to only get weather data within the next 14 days, or </a:t>
-            </a:r>
-            <a:r>
-              <a:rPr lang="en-CA" b="1" dirty="0" err="1"/>
-              <a:t>weather.forecast.medians</a:t>
-            </a:r>
-            <a:r>
-              <a:rPr lang="en-CA" b="1" dirty="0"/>
-              <a:t>() </a:t>
-            </a:r>
-            <a:r>
-              <a:rPr lang="en-CA" dirty="0"/>
-              <a:t>and more</a:t>
-            </a:r>
-          </a:p>
-          <a:p>
-            <a:r>
-              <a:rPr lang="en-CA" dirty="0"/>
-              <a:t>Simple functions like </a:t>
-            </a:r>
-            <a:r>
-              <a:rPr lang="en-CA" b="1" dirty="0" err="1"/>
-              <a:t>next.snow.day</a:t>
-            </a:r>
-            <a:r>
-              <a:rPr lang="en-CA" b="1" dirty="0"/>
-              <a:t>()</a:t>
-            </a:r>
-            <a:r>
-              <a:rPr lang="en-CA" dirty="0"/>
-              <a:t>,</a:t>
-            </a:r>
-            <a:r>
-              <a:rPr lang="en-CA" b="1" dirty="0"/>
-              <a:t> </a:t>
-            </a:r>
-            <a:r>
-              <a:rPr lang="en-CA" dirty="0"/>
-              <a:t>to get the next day that will snow, or the number of sunny days in the next few weeks</a:t>
+          <a:bodyPr wrap="square" rtlCol="0">
+            <a:spAutoFit/>
+          </a:bodyPr>
+          <a:lstStyle/>
+          <a:p>
+            <a:pPr algn="ctr"/>
+            <a:r>
+              <a:rPr lang="en-CA" sz="4800" b="1" dirty="0"/>
+              <a:t>Current Returned JSON Object:</a:t>
             </a:r>
           </a:p>
         </p:txBody>
@@ -4190,7 +4506,7 @@
     </p:spTree>
     <p:extLst>
       <p:ext uri="{BB962C8B-B14F-4D97-AF65-F5344CB8AC3E}">
-        <p14:creationId xmlns:p14="http://schemas.microsoft.com/office/powerpoint/2010/main" val="3054548008"/>
+        <p14:creationId xmlns:p14="http://schemas.microsoft.com/office/powerpoint/2010/main" val="3127077142"/>
       </p:ext>
     </p:extLst>
   </p:cSld>
@@ -4222,6 +4538,332 @@
           <p:cNvPr id="2" name="Title 1">
             <a:extLst>
               <a:ext uri="{FF2B5EF4-FFF2-40B4-BE49-F238E27FC236}">
+                <a16:creationId xmlns:a16="http://schemas.microsoft.com/office/drawing/2014/main" id="{6DFB0C81-E219-E4E3-548E-360290808770}"/>
+              </a:ext>
+            </a:extLst>
+          </p:cNvPr>
+          <p:cNvSpPr>
+            <a:spLocks noGrp="1"/>
+          </p:cNvSpPr>
+          <p:nvPr>
+            <p:ph type="title"/>
+          </p:nvPr>
+        </p:nvSpPr>
+        <p:spPr>
+          <a:xfrm>
+            <a:off x="838200" y="18255"/>
+            <a:ext cx="10515600" cy="1325563"/>
+          </a:xfrm>
+        </p:spPr>
+        <p:txBody>
+          <a:bodyPr>
+            <a:normAutofit/>
+          </a:bodyPr>
+          <a:lstStyle/>
+          <a:p>
+            <a:pPr algn="ctr"/>
+            <a:r>
+              <a:rPr lang="en-CA" sz="6600" b="1" dirty="0"/>
+              <a:t>Our Solution</a:t>
+            </a:r>
+          </a:p>
+        </p:txBody>
+      </p:sp>
+      <p:sp>
+        <p:nvSpPr>
+          <p:cNvPr id="3" name="Content Placeholder 2">
+            <a:extLst>
+              <a:ext uri="{FF2B5EF4-FFF2-40B4-BE49-F238E27FC236}">
+                <a16:creationId xmlns:a16="http://schemas.microsoft.com/office/drawing/2014/main" id="{EAA93609-261F-FBB6-A5FC-02C369379B9C}"/>
+              </a:ext>
+            </a:extLst>
+          </p:cNvPr>
+          <p:cNvSpPr>
+            <a:spLocks noGrp="1"/>
+          </p:cNvSpPr>
+          <p:nvPr>
+            <p:ph idx="1"/>
+          </p:nvPr>
+        </p:nvSpPr>
+        <p:spPr>
+          <a:xfrm>
+            <a:off x="838200" y="1063624"/>
+            <a:ext cx="10515600" cy="5169535"/>
+          </a:xfrm>
+        </p:spPr>
+        <p:txBody>
+          <a:bodyPr>
+            <a:normAutofit/>
+          </a:bodyPr>
+          <a:lstStyle/>
+          <a:p>
+            <a:r>
+              <a:rPr lang="en-CA" dirty="0"/>
+              <a:t>A catch all function </a:t>
+            </a:r>
+            <a:r>
+              <a:rPr lang="en-CA" b="1" dirty="0" err="1"/>
+              <a:t>weather.range</a:t>
+            </a:r>
+            <a:r>
+              <a:rPr lang="en-CA" b="1" dirty="0"/>
+              <a:t>(charts, </a:t>
+            </a:r>
+            <a:r>
+              <a:rPr lang="en-CA" b="1" dirty="0" err="1"/>
+              <a:t>rangeStart</a:t>
+            </a:r>
+            <a:r>
+              <a:rPr lang="en-CA" b="1" dirty="0"/>
+              <a:t>, </a:t>
+            </a:r>
+            <a:r>
+              <a:rPr lang="en-CA" b="1" dirty="0" err="1"/>
+              <a:t>rangeEnd</a:t>
+            </a:r>
+            <a:r>
+              <a:rPr lang="en-CA" b="1" dirty="0"/>
+              <a:t>, interval, location, metrics = [], stats = [], </a:t>
+            </a:r>
+            <a:r>
+              <a:rPr lang="en-CA" b="1" dirty="0" err="1"/>
+              <a:t>stat_interval</a:t>
+            </a:r>
+            <a:r>
+              <a:rPr lang="en-CA" b="1" dirty="0"/>
+              <a:t>, </a:t>
+            </a:r>
+            <a:r>
+              <a:rPr lang="en-CA" b="1" dirty="0" err="1"/>
+              <a:t>timezone</a:t>
+            </a:r>
+            <a:r>
+              <a:rPr lang="en-CA" b="1" dirty="0"/>
+              <a:t>) </a:t>
+            </a:r>
+            <a:r>
+              <a:rPr lang="en-CA" dirty="0"/>
+              <a:t>to wrap all 3 of the endpoints into one, returning the weather data over any time range as a clean data frame.</a:t>
+            </a:r>
+          </a:p>
+          <a:p>
+            <a:r>
+              <a:rPr lang="en-CA" dirty="0"/>
+              <a:t>Allows location parameter to be an address, city or long/</a:t>
+            </a:r>
+            <a:r>
+              <a:rPr lang="en-CA" dirty="0" err="1"/>
+              <a:t>lat</a:t>
+            </a:r>
+            <a:r>
+              <a:rPr lang="en-CA" dirty="0"/>
+              <a:t> format</a:t>
+            </a:r>
+          </a:p>
+          <a:p>
+            <a:r>
+              <a:rPr lang="en-CA" dirty="0"/>
+              <a:t>Allows any stat ranges</a:t>
+            </a:r>
+          </a:p>
+          <a:p>
+            <a:r>
+              <a:rPr lang="en-CA" dirty="0"/>
+              <a:t>Allows time ranges to be any combination of past, current or future dates</a:t>
+            </a:r>
+          </a:p>
+          <a:p>
+            <a:r>
+              <a:rPr lang="en-CA" dirty="0"/>
+              <a:t>Much easier to use function params than endpoint params </a:t>
+            </a:r>
+          </a:p>
+        </p:txBody>
+      </p:sp>
+    </p:spTree>
+    <p:extLst>
+      <p:ext uri="{BB962C8B-B14F-4D97-AF65-F5344CB8AC3E}">
+        <p14:creationId xmlns:p14="http://schemas.microsoft.com/office/powerpoint/2010/main" val="60825484"/>
+      </p:ext>
+    </p:extLst>
+  </p:cSld>
+  <p:clrMapOvr>
+    <a:masterClrMapping/>
+  </p:clrMapOvr>
+</p:sld>
+</file>
+
+<file path=ppt/slides/slide6.xml><?xml version="1.0" encoding="utf-8"?>
+<p:sld xmlns:a="http://schemas.openxmlformats.org/drawingml/2006/main" xmlns:r="http://schemas.openxmlformats.org/officeDocument/2006/relationships" xmlns:p="http://schemas.openxmlformats.org/presentationml/2006/main">
+  <p:cSld>
+    <p:spTree>
+      <p:nvGrpSpPr>
+        <p:cNvPr id="1" name=""/>
+        <p:cNvGrpSpPr/>
+        <p:nvPr/>
+      </p:nvGrpSpPr>
+      <p:grpSpPr>
+        <a:xfrm>
+          <a:off x="0" y="0"/>
+          <a:ext cx="0" cy="0"/>
+          <a:chOff x="0" y="0"/>
+          <a:chExt cx="0" cy="0"/>
+        </a:xfrm>
+      </p:grpSpPr>
+      <p:sp>
+        <p:nvSpPr>
+          <p:cNvPr id="2" name="Title 1">
+            <a:extLst>
+              <a:ext uri="{FF2B5EF4-FFF2-40B4-BE49-F238E27FC236}">
+                <a16:creationId xmlns:a16="http://schemas.microsoft.com/office/drawing/2014/main" id="{38B4628B-8EB3-E9EB-F455-F7AAEB847B9E}"/>
+              </a:ext>
+            </a:extLst>
+          </p:cNvPr>
+          <p:cNvSpPr>
+            <a:spLocks noGrp="1"/>
+          </p:cNvSpPr>
+          <p:nvPr>
+            <p:ph type="title"/>
+          </p:nvPr>
+        </p:nvSpPr>
+        <p:spPr>
+          <a:xfrm>
+            <a:off x="838200" y="365125"/>
+            <a:ext cx="10515600" cy="838835"/>
+          </a:xfrm>
+        </p:spPr>
+        <p:txBody>
+          <a:bodyPr>
+            <a:normAutofit/>
+          </a:bodyPr>
+          <a:lstStyle/>
+          <a:p>
+            <a:pPr algn="ctr"/>
+            <a:r>
+              <a:rPr lang="en-CA" sz="4800" b="1" dirty="0"/>
+              <a:t>EXTRAS</a:t>
+            </a:r>
+          </a:p>
+        </p:txBody>
+      </p:sp>
+      <p:sp>
+        <p:nvSpPr>
+          <p:cNvPr id="3" name="Content Placeholder 2">
+            <a:extLst>
+              <a:ext uri="{FF2B5EF4-FFF2-40B4-BE49-F238E27FC236}">
+                <a16:creationId xmlns:a16="http://schemas.microsoft.com/office/drawing/2014/main" id="{542B5D9C-FA30-10AF-D7C7-D6ED3DFAECC6}"/>
+              </a:ext>
+            </a:extLst>
+          </p:cNvPr>
+          <p:cNvSpPr>
+            <a:spLocks noGrp="1"/>
+          </p:cNvSpPr>
+          <p:nvPr>
+            <p:ph idx="1"/>
+          </p:nvPr>
+        </p:nvSpPr>
+        <p:spPr>
+          <a:xfrm>
+            <a:off x="838200" y="1520825"/>
+            <a:ext cx="10515600" cy="4351338"/>
+          </a:xfrm>
+        </p:spPr>
+        <p:txBody>
+          <a:bodyPr/>
+          <a:lstStyle/>
+          <a:p>
+            <a:r>
+              <a:rPr lang="en-CA" dirty="0"/>
+              <a:t>Simplified versions of the catch all date range function will be provided, like </a:t>
+            </a:r>
+            <a:r>
+              <a:rPr lang="en-CA" b="1" dirty="0" err="1"/>
+              <a:t>weather.forecast</a:t>
+            </a:r>
+            <a:r>
+              <a:rPr lang="en-CA" b="1" dirty="0"/>
+              <a:t>() </a:t>
+            </a:r>
+            <a:r>
+              <a:rPr lang="en-CA" dirty="0"/>
+              <a:t>to only get weather data within the next 14 days, or </a:t>
+            </a:r>
+            <a:r>
+              <a:rPr lang="en-CA" b="1" dirty="0" err="1"/>
+              <a:t>weather.forecast.medians</a:t>
+            </a:r>
+            <a:r>
+              <a:rPr lang="en-CA" b="1" dirty="0"/>
+              <a:t>() </a:t>
+            </a:r>
+            <a:r>
+              <a:rPr lang="en-CA" dirty="0"/>
+              <a:t>and more</a:t>
+            </a:r>
+          </a:p>
+          <a:p>
+            <a:r>
+              <a:rPr lang="en-CA" dirty="0"/>
+              <a:t>Simple functions like </a:t>
+            </a:r>
+            <a:r>
+              <a:rPr lang="en-CA" b="1" dirty="0" err="1"/>
+              <a:t>next.snow.day</a:t>
+            </a:r>
+            <a:r>
+              <a:rPr lang="en-CA" b="1" dirty="0"/>
+              <a:t>()</a:t>
+            </a:r>
+            <a:r>
+              <a:rPr lang="en-CA" dirty="0"/>
+              <a:t>,</a:t>
+            </a:r>
+            <a:r>
+              <a:rPr lang="en-CA" b="1" dirty="0"/>
+              <a:t> </a:t>
+            </a:r>
+            <a:r>
+              <a:rPr lang="en-CA" dirty="0"/>
+              <a:t>to get the next day that will snow, or the number of sunny days in the next few weeks</a:t>
+            </a:r>
+          </a:p>
+        </p:txBody>
+      </p:sp>
+    </p:spTree>
+    <p:extLst>
+      <p:ext uri="{BB962C8B-B14F-4D97-AF65-F5344CB8AC3E}">
+        <p14:creationId xmlns:p14="http://schemas.microsoft.com/office/powerpoint/2010/main" val="3054548008"/>
+      </p:ext>
+    </p:extLst>
+  </p:cSld>
+  <p:clrMapOvr>
+    <a:masterClrMapping/>
+  </p:clrMapOvr>
+</p:sld>
+</file>
+
+<file path=ppt/slides/slide7.xml><?xml version="1.0" encoding="utf-8"?>
+<p:sld xmlns:a="http://schemas.openxmlformats.org/drawingml/2006/main" xmlns:r="http://schemas.openxmlformats.org/officeDocument/2006/relationships" xmlns:p="http://schemas.openxmlformats.org/presentationml/2006/main">
+  <p:cSld>
+    <p:spTree>
+      <p:nvGrpSpPr>
+        <p:cNvPr id="1" name=""/>
+        <p:cNvGrpSpPr/>
+        <p:nvPr/>
+      </p:nvGrpSpPr>
+      <p:grpSpPr>
+        <a:xfrm>
+          <a:off x="0" y="0"/>
+          <a:ext cx="0" cy="0"/>
+          <a:chOff x="0" y="0"/>
+          <a:chExt cx="0" cy="0"/>
+        </a:xfrm>
+      </p:grpSpPr>
+      <p:sp>
+        <p:nvSpPr>
+          <p:cNvPr id="2" name="Title 1">
+            <a:extLst>
+              <a:ext uri="{FF2B5EF4-FFF2-40B4-BE49-F238E27FC236}">
                 <a16:creationId xmlns:a16="http://schemas.microsoft.com/office/drawing/2014/main" id="{8B70C4F5-CC3A-3031-6A34-51077536BB0E}"/>
               </a:ext>
             </a:extLst>
@@ -4269,7 +4911,7 @@
         </p:nvSpPr>
         <p:spPr>
           <a:xfrm>
-            <a:off x="838200" y="4926806"/>
+            <a:off x="950935" y="5557504"/>
             <a:ext cx="10515600" cy="998538"/>
           </a:xfrm>
         </p:spPr>
@@ -4284,6 +4926,42 @@
           </a:p>
         </p:txBody>
       </p:sp>
+      <p:pic>
+        <p:nvPicPr>
+          <p:cNvPr id="6" name="Content Placeholder 4">
+            <a:extLst>
+              <a:ext uri="{FF2B5EF4-FFF2-40B4-BE49-F238E27FC236}">
+                <a16:creationId xmlns:a16="http://schemas.microsoft.com/office/drawing/2014/main" id="{04A6886B-F8A9-23D7-447F-AD132F856CC3}"/>
+              </a:ext>
+            </a:extLst>
+          </p:cNvPr>
+          <p:cNvPicPr>
+            <a:picLocks noChangeAspect="1"/>
+          </p:cNvPicPr>
+          <p:nvPr/>
+        </p:nvPicPr>
+        <p:blipFill>
+          <a:blip r:embed="rId2">
+            <a:extLst>
+              <a:ext uri="{28A0092B-C50C-407E-A947-70E740481C1C}">
+                <a14:useLocalDpi xmlns:a14="http://schemas.microsoft.com/office/drawing/2010/main" val="0"/>
+              </a:ext>
+            </a:extLst>
+          </a:blip>
+          <a:stretch>
+            <a:fillRect/>
+          </a:stretch>
+        </p:blipFill>
+        <p:spPr>
+          <a:xfrm>
+            <a:off x="2175353" y="1101372"/>
+            <a:ext cx="7841293" cy="4352136"/>
+          </a:xfrm>
+          <a:prstGeom prst="rect">
+            <a:avLst/>
+          </a:prstGeom>
+        </p:spPr>
+      </p:pic>
     </p:spTree>
     <p:extLst>
       <p:ext uri="{BB962C8B-B14F-4D97-AF65-F5344CB8AC3E}">

</xml_diff>